<commit_message>
big commit to catch up
</commit_message>
<xml_diff>
--- a/figures/MSE_model_structure.pptx
+++ b/figures/MSE_model_structure.pptx
@@ -259,7 +259,7 @@
           <a:p>
             <a:fld id="{28A14A08-DBC6-BF47-827E-B77B295AE5CE}" type="datetimeFigureOut">
               <a:rPr lang="en-US" smtClean="0"/>
-              <a:t>8/30/19</a:t>
+              <a:t>9/7/19</a:t>
             </a:fld>
             <a:endParaRPr lang="en-US"/>
           </a:p>
@@ -457,7 +457,7 @@
           <a:p>
             <a:fld id="{28A14A08-DBC6-BF47-827E-B77B295AE5CE}" type="datetimeFigureOut">
               <a:rPr lang="en-US" smtClean="0"/>
-              <a:t>8/30/19</a:t>
+              <a:t>9/7/19</a:t>
             </a:fld>
             <a:endParaRPr lang="en-US"/>
           </a:p>
@@ -665,7 +665,7 @@
           <a:p>
             <a:fld id="{28A14A08-DBC6-BF47-827E-B77B295AE5CE}" type="datetimeFigureOut">
               <a:rPr lang="en-US" smtClean="0"/>
-              <a:t>8/30/19</a:t>
+              <a:t>9/7/19</a:t>
             </a:fld>
             <a:endParaRPr lang="en-US"/>
           </a:p>
@@ -863,7 +863,7 @@
           <a:p>
             <a:fld id="{28A14A08-DBC6-BF47-827E-B77B295AE5CE}" type="datetimeFigureOut">
               <a:rPr lang="en-US" smtClean="0"/>
-              <a:t>8/30/19</a:t>
+              <a:t>9/7/19</a:t>
             </a:fld>
             <a:endParaRPr lang="en-US"/>
           </a:p>
@@ -1138,7 +1138,7 @@
           <a:p>
             <a:fld id="{28A14A08-DBC6-BF47-827E-B77B295AE5CE}" type="datetimeFigureOut">
               <a:rPr lang="en-US" smtClean="0"/>
-              <a:t>8/30/19</a:t>
+              <a:t>9/7/19</a:t>
             </a:fld>
             <a:endParaRPr lang="en-US"/>
           </a:p>
@@ -1403,7 +1403,7 @@
           <a:p>
             <a:fld id="{28A14A08-DBC6-BF47-827E-B77B295AE5CE}" type="datetimeFigureOut">
               <a:rPr lang="en-US" smtClean="0"/>
-              <a:t>8/30/19</a:t>
+              <a:t>9/7/19</a:t>
             </a:fld>
             <a:endParaRPr lang="en-US"/>
           </a:p>
@@ -1815,7 +1815,7 @@
           <a:p>
             <a:fld id="{28A14A08-DBC6-BF47-827E-B77B295AE5CE}" type="datetimeFigureOut">
               <a:rPr lang="en-US" smtClean="0"/>
-              <a:t>8/30/19</a:t>
+              <a:t>9/7/19</a:t>
             </a:fld>
             <a:endParaRPr lang="en-US"/>
           </a:p>
@@ -1956,7 +1956,7 @@
           <a:p>
             <a:fld id="{28A14A08-DBC6-BF47-827E-B77B295AE5CE}" type="datetimeFigureOut">
               <a:rPr lang="en-US" smtClean="0"/>
-              <a:t>8/30/19</a:t>
+              <a:t>9/7/19</a:t>
             </a:fld>
             <a:endParaRPr lang="en-US"/>
           </a:p>
@@ -2069,7 +2069,7 @@
           <a:p>
             <a:fld id="{28A14A08-DBC6-BF47-827E-B77B295AE5CE}" type="datetimeFigureOut">
               <a:rPr lang="en-US" smtClean="0"/>
-              <a:t>8/30/19</a:t>
+              <a:t>9/7/19</a:t>
             </a:fld>
             <a:endParaRPr lang="en-US"/>
           </a:p>
@@ -2380,7 +2380,7 @@
           <a:p>
             <a:fld id="{28A14A08-DBC6-BF47-827E-B77B295AE5CE}" type="datetimeFigureOut">
               <a:rPr lang="en-US" smtClean="0"/>
-              <a:t>8/30/19</a:t>
+              <a:t>9/7/19</a:t>
             </a:fld>
             <a:endParaRPr lang="en-US"/>
           </a:p>
@@ -2668,7 +2668,7 @@
           <a:p>
             <a:fld id="{28A14A08-DBC6-BF47-827E-B77B295AE5CE}" type="datetimeFigureOut">
               <a:rPr lang="en-US" smtClean="0"/>
-              <a:t>8/30/19</a:t>
+              <a:t>9/7/19</a:t>
             </a:fld>
             <a:endParaRPr lang="en-US"/>
           </a:p>
@@ -2909,7 +2909,7 @@
           <a:p>
             <a:fld id="{28A14A08-DBC6-BF47-827E-B77B295AE5CE}" type="datetimeFigureOut">
               <a:rPr lang="en-US" smtClean="0"/>
-              <a:t>8/30/19</a:t>
+              <a:t>9/7/19</a:t>
             </a:fld>
             <a:endParaRPr lang="en-US"/>
           </a:p>

</xml_diff>